<commit_message>
Updated CEMBA overview for ALLC
</commit_message>
<xml_diff>
--- a/website/docs/documentation/Pipelines/CEMBA_MethylC_Seq_Pipeline/diagrampptx_1.pptx
+++ b/website/docs/documentation/Pipelines/CEMBA_MethylC_Seq_Pipeline/diagrampptx_1.pptx
@@ -259,7 +259,7 @@
           <a:p>
             <a:fld id="{1DB9FB6B-D340-4C4C-9D9B-691BC316EED9}" type="datetimeFigureOut">
               <a:rPr lang="en-US" smtClean="0"/>
-              <a:t>1/11/21</a:t>
+              <a:t>2/2/21</a:t>
             </a:fld>
             <a:endParaRPr lang="en-US"/>
           </a:p>
@@ -457,7 +457,7 @@
           <a:p>
             <a:fld id="{1DB9FB6B-D340-4C4C-9D9B-691BC316EED9}" type="datetimeFigureOut">
               <a:rPr lang="en-US" smtClean="0"/>
-              <a:t>1/11/21</a:t>
+              <a:t>2/2/21</a:t>
             </a:fld>
             <a:endParaRPr lang="en-US"/>
           </a:p>
@@ -665,7 +665,7 @@
           <a:p>
             <a:fld id="{1DB9FB6B-D340-4C4C-9D9B-691BC316EED9}" type="datetimeFigureOut">
               <a:rPr lang="en-US" smtClean="0"/>
-              <a:t>1/11/21</a:t>
+              <a:t>2/2/21</a:t>
             </a:fld>
             <a:endParaRPr lang="en-US"/>
           </a:p>
@@ -863,7 +863,7 @@
           <a:p>
             <a:fld id="{1DB9FB6B-D340-4C4C-9D9B-691BC316EED9}" type="datetimeFigureOut">
               <a:rPr lang="en-US" smtClean="0"/>
-              <a:t>1/11/21</a:t>
+              <a:t>2/2/21</a:t>
             </a:fld>
             <a:endParaRPr lang="en-US"/>
           </a:p>
@@ -1138,7 +1138,7 @@
           <a:p>
             <a:fld id="{1DB9FB6B-D340-4C4C-9D9B-691BC316EED9}" type="datetimeFigureOut">
               <a:rPr lang="en-US" smtClean="0"/>
-              <a:t>1/11/21</a:t>
+              <a:t>2/2/21</a:t>
             </a:fld>
             <a:endParaRPr lang="en-US"/>
           </a:p>
@@ -1403,7 +1403,7 @@
           <a:p>
             <a:fld id="{1DB9FB6B-D340-4C4C-9D9B-691BC316EED9}" type="datetimeFigureOut">
               <a:rPr lang="en-US" smtClean="0"/>
-              <a:t>1/11/21</a:t>
+              <a:t>2/2/21</a:t>
             </a:fld>
             <a:endParaRPr lang="en-US"/>
           </a:p>
@@ -1815,7 +1815,7 @@
           <a:p>
             <a:fld id="{1DB9FB6B-D340-4C4C-9D9B-691BC316EED9}" type="datetimeFigureOut">
               <a:rPr lang="en-US" smtClean="0"/>
-              <a:t>1/11/21</a:t>
+              <a:t>2/2/21</a:t>
             </a:fld>
             <a:endParaRPr lang="en-US"/>
           </a:p>
@@ -1956,7 +1956,7 @@
           <a:p>
             <a:fld id="{1DB9FB6B-D340-4C4C-9D9B-691BC316EED9}" type="datetimeFigureOut">
               <a:rPr lang="en-US" smtClean="0"/>
-              <a:t>1/11/21</a:t>
+              <a:t>2/2/21</a:t>
             </a:fld>
             <a:endParaRPr lang="en-US"/>
           </a:p>
@@ -2069,7 +2069,7 @@
           <a:p>
             <a:fld id="{1DB9FB6B-D340-4C4C-9D9B-691BC316EED9}" type="datetimeFigureOut">
               <a:rPr lang="en-US" smtClean="0"/>
-              <a:t>1/11/21</a:t>
+              <a:t>2/2/21</a:t>
             </a:fld>
             <a:endParaRPr lang="en-US"/>
           </a:p>
@@ -2380,7 +2380,7 @@
           <a:p>
             <a:fld id="{1DB9FB6B-D340-4C4C-9D9B-691BC316EED9}" type="datetimeFigureOut">
               <a:rPr lang="en-US" smtClean="0"/>
-              <a:t>1/11/21</a:t>
+              <a:t>2/2/21</a:t>
             </a:fld>
             <a:endParaRPr lang="en-US"/>
           </a:p>
@@ -2668,7 +2668,7 @@
           <a:p>
             <a:fld id="{1DB9FB6B-D340-4C4C-9D9B-691BC316EED9}" type="datetimeFigureOut">
               <a:rPr lang="en-US" smtClean="0"/>
-              <a:t>1/11/21</a:t>
+              <a:t>2/2/21</a:t>
             </a:fld>
             <a:endParaRPr lang="en-US"/>
           </a:p>
@@ -2909,7 +2909,7 @@
           <a:p>
             <a:fld id="{1DB9FB6B-D340-4C4C-9D9B-691BC316EED9}" type="datetimeFigureOut">
               <a:rPr lang="en-US" smtClean="0"/>
-              <a:t>1/11/21</a:t>
+              <a:t>2/2/21</a:t>
             </a:fld>
             <a:endParaRPr lang="en-US"/>
           </a:p>
@@ -3341,9 +3341,9 @@
         <p:grpSpPr>
           <a:xfrm>
             <a:off x="916328" y="71761"/>
-            <a:ext cx="8698091" cy="6490190"/>
+            <a:ext cx="8698092" cy="6490190"/>
             <a:chOff x="916328" y="71761"/>
-            <a:chExt cx="8698091" cy="6490190"/>
+            <a:chExt cx="8698092" cy="6490190"/>
           </a:xfrm>
         </p:grpSpPr>
         <p:sp>
@@ -3943,8 +3943,8 @@
           </p:nvSpPr>
           <p:spPr>
             <a:xfrm>
-              <a:off x="7542550" y="6064239"/>
-              <a:ext cx="2071869" cy="497712"/>
+              <a:off x="7275444" y="6064239"/>
+              <a:ext cx="2338976" cy="497712"/>
             </a:xfrm>
             <a:prstGeom prst="roundRect">
               <a:avLst/>
@@ -3985,7 +3985,7 @@
                     <a:schemeClr val="tx1"/>
                   </a:solidFill>
                 </a:rPr>
-                <a:t>Produce VCF</a:t>
+                <a:t>Produce VCF, ALLC</a:t>
               </a:r>
             </a:p>
           </p:txBody>
@@ -4502,7 +4502,7 @@
           <p:spPr>
             <a:xfrm>
               <a:off x="6095999" y="5866219"/>
-              <a:ext cx="2482486" cy="198020"/>
+              <a:ext cx="2348933" cy="198020"/>
             </a:xfrm>
             <a:prstGeom prst="bentConnector2">
               <a:avLst/>

</xml_diff>

<commit_message>
Updated CEMBA overview for ALLC (#222)
Updated CEMBA Overview and Methods
</commit_message>
<xml_diff>
--- a/website/docs/documentation/Pipelines/CEMBA_MethylC_Seq_Pipeline/diagrampptx_1.pptx
+++ b/website/docs/documentation/Pipelines/CEMBA_MethylC_Seq_Pipeline/diagrampptx_1.pptx
@@ -259,7 +259,7 @@
           <a:p>
             <a:fld id="{1DB9FB6B-D340-4C4C-9D9B-691BC316EED9}" type="datetimeFigureOut">
               <a:rPr lang="en-US" smtClean="0"/>
-              <a:t>1/11/21</a:t>
+              <a:t>2/2/21</a:t>
             </a:fld>
             <a:endParaRPr lang="en-US"/>
           </a:p>
@@ -457,7 +457,7 @@
           <a:p>
             <a:fld id="{1DB9FB6B-D340-4C4C-9D9B-691BC316EED9}" type="datetimeFigureOut">
               <a:rPr lang="en-US" smtClean="0"/>
-              <a:t>1/11/21</a:t>
+              <a:t>2/2/21</a:t>
             </a:fld>
             <a:endParaRPr lang="en-US"/>
           </a:p>
@@ -665,7 +665,7 @@
           <a:p>
             <a:fld id="{1DB9FB6B-D340-4C4C-9D9B-691BC316EED9}" type="datetimeFigureOut">
               <a:rPr lang="en-US" smtClean="0"/>
-              <a:t>1/11/21</a:t>
+              <a:t>2/2/21</a:t>
             </a:fld>
             <a:endParaRPr lang="en-US"/>
           </a:p>
@@ -863,7 +863,7 @@
           <a:p>
             <a:fld id="{1DB9FB6B-D340-4C4C-9D9B-691BC316EED9}" type="datetimeFigureOut">
               <a:rPr lang="en-US" smtClean="0"/>
-              <a:t>1/11/21</a:t>
+              <a:t>2/2/21</a:t>
             </a:fld>
             <a:endParaRPr lang="en-US"/>
           </a:p>
@@ -1138,7 +1138,7 @@
           <a:p>
             <a:fld id="{1DB9FB6B-D340-4C4C-9D9B-691BC316EED9}" type="datetimeFigureOut">
               <a:rPr lang="en-US" smtClean="0"/>
-              <a:t>1/11/21</a:t>
+              <a:t>2/2/21</a:t>
             </a:fld>
             <a:endParaRPr lang="en-US"/>
           </a:p>
@@ -1403,7 +1403,7 @@
           <a:p>
             <a:fld id="{1DB9FB6B-D340-4C4C-9D9B-691BC316EED9}" type="datetimeFigureOut">
               <a:rPr lang="en-US" smtClean="0"/>
-              <a:t>1/11/21</a:t>
+              <a:t>2/2/21</a:t>
             </a:fld>
             <a:endParaRPr lang="en-US"/>
           </a:p>
@@ -1815,7 +1815,7 @@
           <a:p>
             <a:fld id="{1DB9FB6B-D340-4C4C-9D9B-691BC316EED9}" type="datetimeFigureOut">
               <a:rPr lang="en-US" smtClean="0"/>
-              <a:t>1/11/21</a:t>
+              <a:t>2/2/21</a:t>
             </a:fld>
             <a:endParaRPr lang="en-US"/>
           </a:p>
@@ -1956,7 +1956,7 @@
           <a:p>
             <a:fld id="{1DB9FB6B-D340-4C4C-9D9B-691BC316EED9}" type="datetimeFigureOut">
               <a:rPr lang="en-US" smtClean="0"/>
-              <a:t>1/11/21</a:t>
+              <a:t>2/2/21</a:t>
             </a:fld>
             <a:endParaRPr lang="en-US"/>
           </a:p>
@@ -2069,7 +2069,7 @@
           <a:p>
             <a:fld id="{1DB9FB6B-D340-4C4C-9D9B-691BC316EED9}" type="datetimeFigureOut">
               <a:rPr lang="en-US" smtClean="0"/>
-              <a:t>1/11/21</a:t>
+              <a:t>2/2/21</a:t>
             </a:fld>
             <a:endParaRPr lang="en-US"/>
           </a:p>
@@ -2380,7 +2380,7 @@
           <a:p>
             <a:fld id="{1DB9FB6B-D340-4C4C-9D9B-691BC316EED9}" type="datetimeFigureOut">
               <a:rPr lang="en-US" smtClean="0"/>
-              <a:t>1/11/21</a:t>
+              <a:t>2/2/21</a:t>
             </a:fld>
             <a:endParaRPr lang="en-US"/>
           </a:p>
@@ -2668,7 +2668,7 @@
           <a:p>
             <a:fld id="{1DB9FB6B-D340-4C4C-9D9B-691BC316EED9}" type="datetimeFigureOut">
               <a:rPr lang="en-US" smtClean="0"/>
-              <a:t>1/11/21</a:t>
+              <a:t>2/2/21</a:t>
             </a:fld>
             <a:endParaRPr lang="en-US"/>
           </a:p>
@@ -2909,7 +2909,7 @@
           <a:p>
             <a:fld id="{1DB9FB6B-D340-4C4C-9D9B-691BC316EED9}" type="datetimeFigureOut">
               <a:rPr lang="en-US" smtClean="0"/>
-              <a:t>1/11/21</a:t>
+              <a:t>2/2/21</a:t>
             </a:fld>
             <a:endParaRPr lang="en-US"/>
           </a:p>
@@ -3341,9 +3341,9 @@
         <p:grpSpPr>
           <a:xfrm>
             <a:off x="916328" y="71761"/>
-            <a:ext cx="8698091" cy="6490190"/>
+            <a:ext cx="8698092" cy="6490190"/>
             <a:chOff x="916328" y="71761"/>
-            <a:chExt cx="8698091" cy="6490190"/>
+            <a:chExt cx="8698092" cy="6490190"/>
           </a:xfrm>
         </p:grpSpPr>
         <p:sp>
@@ -3943,8 +3943,8 @@
           </p:nvSpPr>
           <p:spPr>
             <a:xfrm>
-              <a:off x="7542550" y="6064239"/>
-              <a:ext cx="2071869" cy="497712"/>
+              <a:off x="7275444" y="6064239"/>
+              <a:ext cx="2338976" cy="497712"/>
             </a:xfrm>
             <a:prstGeom prst="roundRect">
               <a:avLst/>
@@ -3985,7 +3985,7 @@
                     <a:schemeClr val="tx1"/>
                   </a:solidFill>
                 </a:rPr>
-                <a:t>Produce VCF</a:t>
+                <a:t>Produce VCF, ALLC</a:t>
               </a:r>
             </a:p>
           </p:txBody>
@@ -4502,7 +4502,7 @@
           <p:spPr>
             <a:xfrm>
               <a:off x="6095999" y="5866219"/>
-              <a:ext cx="2482486" cy="198020"/>
+              <a:ext cx="2348933" cy="198020"/>
             </a:xfrm>
             <a:prstGeom prst="bentConnector2">
               <a:avLst/>

</xml_diff>